<commit_message>
deploy: :rocket: Finish Project
- Added payment logic structure and CSS
</commit_message>
<xml_diff>
--- a/presentation.pptx
+++ b/presentation.pptx
@@ -8,10 +8,8 @@
     <p:sldId id="256" r:id="rId2"/>
     <p:sldId id="257" r:id="rId3"/>
     <p:sldId id="258" r:id="rId4"/>
-    <p:sldId id="259" r:id="rId5"/>
-    <p:sldId id="260" r:id="rId6"/>
-    <p:sldId id="261" r:id="rId7"/>
-    <p:sldId id="263" r:id="rId8"/>
+    <p:sldId id="261" r:id="rId5"/>
+    <p:sldId id="263" r:id="rId6"/>
   </p:sldIdLst>
   <p:sldSz cx="9144000" cy="6858000" type="screen4x3"/>
   <p:notesSz cx="6858000" cy="9144000"/>
@@ -308,7 +306,7 @@
           <a:p>
             <a:fld id="{46B45B96-9E2A-43BF-BF0E-07FDB4C74130}" type="datetimeFigureOut">
               <a:rPr lang="pt-BR" smtClean="0"/>
-              <a:t>13/02/2025</a:t>
+              <a:t>18/02/2025</a:t>
             </a:fld>
             <a:endParaRPr lang="pt-BR"/>
           </a:p>
@@ -471,7 +469,7 @@
           <a:p>
             <a:fld id="{46B45B96-9E2A-43BF-BF0E-07FDB4C74130}" type="datetimeFigureOut">
               <a:rPr lang="pt-BR" smtClean="0"/>
-              <a:t>13/02/2025</a:t>
+              <a:t>18/02/2025</a:t>
             </a:fld>
             <a:endParaRPr lang="pt-BR"/>
           </a:p>
@@ -644,7 +642,7 @@
           <a:p>
             <a:fld id="{46B45B96-9E2A-43BF-BF0E-07FDB4C74130}" type="datetimeFigureOut">
               <a:rPr lang="pt-BR" smtClean="0"/>
-              <a:t>13/02/2025</a:t>
+              <a:t>18/02/2025</a:t>
             </a:fld>
             <a:endParaRPr lang="pt-BR"/>
           </a:p>
@@ -807,7 +805,7 @@
           <a:p>
             <a:fld id="{46B45B96-9E2A-43BF-BF0E-07FDB4C74130}" type="datetimeFigureOut">
               <a:rPr lang="pt-BR" smtClean="0"/>
-              <a:t>13/02/2025</a:t>
+              <a:t>18/02/2025</a:t>
             </a:fld>
             <a:endParaRPr lang="pt-BR"/>
           </a:p>
@@ -1047,7 +1045,7 @@
           <a:p>
             <a:fld id="{46B45B96-9E2A-43BF-BF0E-07FDB4C74130}" type="datetimeFigureOut">
               <a:rPr lang="pt-BR" smtClean="0"/>
-              <a:t>13/02/2025</a:t>
+              <a:t>18/02/2025</a:t>
             </a:fld>
             <a:endParaRPr lang="pt-BR"/>
           </a:p>
@@ -1327,7 +1325,7 @@
           <a:p>
             <a:fld id="{46B45B96-9E2A-43BF-BF0E-07FDB4C74130}" type="datetimeFigureOut">
               <a:rPr lang="pt-BR" smtClean="0"/>
-              <a:t>13/02/2025</a:t>
+              <a:t>18/02/2025</a:t>
             </a:fld>
             <a:endParaRPr lang="pt-BR"/>
           </a:p>
@@ -1741,7 +1739,7 @@
           <a:p>
             <a:fld id="{46B45B96-9E2A-43BF-BF0E-07FDB4C74130}" type="datetimeFigureOut">
               <a:rPr lang="pt-BR" smtClean="0"/>
-              <a:t>13/02/2025</a:t>
+              <a:t>18/02/2025</a:t>
             </a:fld>
             <a:endParaRPr lang="pt-BR"/>
           </a:p>
@@ -1853,7 +1851,7 @@
           <a:p>
             <a:fld id="{46B45B96-9E2A-43BF-BF0E-07FDB4C74130}" type="datetimeFigureOut">
               <a:rPr lang="pt-BR" smtClean="0"/>
-              <a:t>13/02/2025</a:t>
+              <a:t>18/02/2025</a:t>
             </a:fld>
             <a:endParaRPr lang="pt-BR"/>
           </a:p>
@@ -1943,7 +1941,7 @@
           <a:p>
             <a:fld id="{46B45B96-9E2A-43BF-BF0E-07FDB4C74130}" type="datetimeFigureOut">
               <a:rPr lang="pt-BR" smtClean="0"/>
-              <a:t>13/02/2025</a:t>
+              <a:t>18/02/2025</a:t>
             </a:fld>
             <a:endParaRPr lang="pt-BR"/>
           </a:p>
@@ -2213,7 +2211,7 @@
           <a:p>
             <a:fld id="{46B45B96-9E2A-43BF-BF0E-07FDB4C74130}" type="datetimeFigureOut">
               <a:rPr lang="pt-BR" smtClean="0"/>
-              <a:t>13/02/2025</a:t>
+              <a:t>18/02/2025</a:t>
             </a:fld>
             <a:endParaRPr lang="pt-BR"/>
           </a:p>
@@ -2460,7 +2458,7 @@
           <a:p>
             <a:fld id="{46B45B96-9E2A-43BF-BF0E-07FDB4C74130}" type="datetimeFigureOut">
               <a:rPr lang="pt-BR" smtClean="0"/>
-              <a:t>13/02/2025</a:t>
+              <a:t>18/02/2025</a:t>
             </a:fld>
             <a:endParaRPr lang="pt-BR"/>
           </a:p>
@@ -2675,7 +2673,7 @@
           <a:p>
             <a:fld id="{46B45B96-9E2A-43BF-BF0E-07FDB4C74130}" type="datetimeFigureOut">
               <a:rPr lang="pt-BR" smtClean="0"/>
-              <a:t>13/02/2025</a:t>
+              <a:t>18/02/2025</a:t>
             </a:fld>
             <a:endParaRPr lang="pt-BR"/>
           </a:p>
@@ -3152,60 +3150,7 @@
                   </a:outerShdw>
                 </a:effectLst>
               </a:rPr>
-              <a:t>Apresentado por: </a:t>
-            </a:r>
-            <a:r>
-              <a:rPr lang="pt-BR" sz="2800" b="1" dirty="0" err="1">
-                <a:solidFill>
-                  <a:schemeClr val="tx1"/>
-                </a:solidFill>
-                <a:effectLst>
-                  <a:glow rad="101600">
-                    <a:schemeClr val="bg1">
-                      <a:alpha val="52000"/>
-                    </a:schemeClr>
-                  </a:glow>
-                  <a:outerShdw blurRad="50800" dist="50800" dir="5400000" algn="ctr" rotWithShape="0">
-                    <a:srgbClr val="00B050"/>
-                  </a:outerShdw>
-                </a:effectLst>
-              </a:rPr>
-              <a:t>Evanói</a:t>
-            </a:r>
-            <a:endParaRPr lang="pt-BR" sz="2800" b="1" dirty="0">
-              <a:solidFill>
-                <a:schemeClr val="tx1"/>
-              </a:solidFill>
-              <a:effectLst>
-                <a:glow rad="101600">
-                  <a:schemeClr val="bg1">
-                    <a:alpha val="52000"/>
-                  </a:schemeClr>
-                </a:glow>
-                <a:outerShdw blurRad="50800" dist="50800" dir="5400000" algn="ctr" rotWithShape="0">
-                  <a:srgbClr val="00B050"/>
-                </a:outerShdw>
-              </a:effectLst>
-            </a:endParaRPr>
-          </a:p>
-          <a:p>
-            <a:r>
-              <a:rPr lang="pt-BR" sz="2800" b="1" dirty="0">
-                <a:solidFill>
-                  <a:schemeClr val="tx1"/>
-                </a:solidFill>
-                <a:effectLst>
-                  <a:glow rad="101600">
-                    <a:schemeClr val="bg1">
-                      <a:alpha val="52000"/>
-                    </a:schemeClr>
-                  </a:glow>
-                  <a:outerShdw blurRad="50800" dist="50800" dir="5400000" algn="ctr" rotWithShape="0">
-                    <a:srgbClr val="00B050"/>
-                  </a:outerShdw>
-                </a:effectLst>
-              </a:rPr>
-              <a:t>		        Flávia</a:t>
+              <a:t>Apresentado por: Evanói</a:t>
             </a:r>
           </a:p>
           <a:p>
@@ -3227,49 +3172,6 @@
               </a:rPr>
               <a:t>	   	     Igor</a:t>
             </a:r>
-          </a:p>
-          <a:p>
-            <a:r>
-              <a:rPr lang="pt-BR" sz="2800" b="1" dirty="0">
-                <a:solidFill>
-                  <a:schemeClr val="tx1"/>
-                </a:solidFill>
-                <a:effectLst>
-                  <a:glow rad="101600">
-                    <a:schemeClr val="bg1">
-                      <a:alpha val="52000"/>
-                    </a:schemeClr>
-                  </a:glow>
-                  <a:outerShdw blurRad="50800" dist="50800" dir="5400000" algn="ctr" rotWithShape="0">
-                    <a:srgbClr val="00B050"/>
-                  </a:outerShdw>
-                </a:effectLst>
-              </a:rPr>
-              <a:t>			</a:t>
-            </a:r>
-            <a:r>
-              <a:rPr lang="pt-BR" sz="2800" b="1" dirty="0" err="1">
-                <a:solidFill>
-                  <a:schemeClr val="tx1"/>
-                </a:solidFill>
-                <a:effectLst>
-                  <a:glow rad="101600">
-                    <a:schemeClr val="bg1">
-                      <a:alpha val="52000"/>
-                    </a:schemeClr>
-                  </a:glow>
-                  <a:outerShdw blurRad="50800" dist="50800" dir="5400000" algn="ctr" rotWithShape="0">
-                    <a:srgbClr val="00B050"/>
-                  </a:outerShdw>
-                </a:effectLst>
-              </a:rPr>
-              <a:t>JJFeline</a:t>
-            </a:r>
-            <a:endParaRPr lang="pt-BR" sz="2800" dirty="0">
-              <a:solidFill>
-                <a:schemeClr val="bg1"/>
-              </a:solidFill>
-            </a:endParaRPr>
           </a:p>
         </p:txBody>
       </p:sp>
@@ -3309,6 +3211,10 @@
           </p:nvPr>
         </p:nvSpPr>
         <p:spPr>
+          <a:xfrm>
+            <a:off x="282352" y="527402"/>
+            <a:ext cx="8579296" cy="1143000"/>
+          </a:xfrm>
           <a:effectLst>
             <a:outerShdw blurRad="50800" dist="50800" dir="5400000" algn="ctr" rotWithShape="0">
               <a:srgbClr val="00B050"/>
@@ -3316,39 +3222,45 @@
           </a:effectLst>
         </p:spPr>
         <p:txBody>
-          <a:bodyPr/>
-          <a:lstStyle/>
-          <a:p>
-            <a:r>
-              <a:rPr lang="pt-BR" b="1" dirty="0"/>
-              <a:t>Propósitos e Objetivos</a:t>
-            </a:r>
-          </a:p>
-        </p:txBody>
-      </p:sp>
-      <p:sp>
-        <p:nvSpPr>
-          <p:cNvPr id="8" name="Espaço Reservado para Conteúdo 7"/>
-          <p:cNvSpPr>
-            <a:spLocks noGrp="1"/>
-          </p:cNvSpPr>
-          <p:nvPr>
-            <p:ph sz="half" idx="2"/>
-          </p:nvPr>
+          <a:bodyPr>
+            <a:normAutofit/>
+          </a:bodyPr>
+          <a:lstStyle/>
+          <a:p>
+            <a:r>
+              <a:rPr lang="pt-BR" sz="4000" b="1" dirty="0"/>
+              <a:t>🌱 Missão, Visão e Valores 🌱</a:t>
+            </a:r>
+          </a:p>
+        </p:txBody>
+      </p:sp>
+      <p:sp>
+        <p:nvSpPr>
+          <p:cNvPr id="5" name="Espaço Reservado para Conteúdo 7">
+            <a:extLst>
+              <a:ext uri="{FF2B5EF4-FFF2-40B4-BE49-F238E27FC236}">
+                <a16:creationId xmlns:a16="http://schemas.microsoft.com/office/drawing/2014/main" id="{1781AEF7-3C4F-1E2A-422B-FE412ABF02C7}"/>
+              </a:ext>
+            </a:extLst>
+          </p:cNvPr>
+          <p:cNvSpPr txBox="1">
+            <a:spLocks/>
+          </p:cNvSpPr>
+          <p:nvPr/>
         </p:nvSpPr>
         <p:spPr>
           <a:xfrm>
-            <a:off x="395536" y="1772816"/>
-            <a:ext cx="4040188" cy="3951288"/>
+            <a:off x="899592" y="2996952"/>
+            <a:ext cx="6896000" cy="1053216"/>
           </a:xfrm>
+          <a:prstGeom prst="rect">
+            <a:avLst/>
+          </a:prstGeom>
           <a:solidFill>
             <a:schemeClr val="accent3">
               <a:alpha val="50000"/>
             </a:schemeClr>
           </a:solidFill>
-          <a:ln>
-            <a:noFill/>
-          </a:ln>
           <a:effectLst>
             <a:outerShdw blurRad="50800" dist="50800" dir="5400000" algn="ctr" rotWithShape="0">
               <a:schemeClr val="tx1">
@@ -3373,22 +3285,376 @@
           </a:fontRef>
         </p:style>
         <p:txBody>
-          <a:bodyPr anchor="ctr">
-            <a:normAutofit fontScale="85000" lnSpcReduction="10000"/>
+          <a:bodyPr vert="horz" lIns="91440" tIns="45720" rIns="91440" bIns="45720" rtlCol="0" anchor="ctr">
+            <a:normAutofit/>
           </a:bodyPr>
-          <a:lstStyle/>
+          <a:lstStyle>
+            <a:lvl1pPr marL="342900" indent="-342900" algn="l" defTabSz="914400" rtl="0" eaLnBrk="1" latinLnBrk="0" hangingPunct="1">
+              <a:spcBef>
+                <a:spcPct val="20000"/>
+              </a:spcBef>
+              <a:buFont typeface="Arial" pitchFamily="34" charset="0"/>
+              <a:buChar char="•"/>
+              <a:defRPr sz="2400" kern="1200">
+                <a:solidFill>
+                  <a:schemeClr val="lt1"/>
+                </a:solidFill>
+                <a:latin typeface="+mn-lt"/>
+                <a:ea typeface="+mn-ea"/>
+                <a:cs typeface="+mn-cs"/>
+              </a:defRPr>
+            </a:lvl1pPr>
+            <a:lvl2pPr marL="742950" indent="-285750" algn="l" defTabSz="914400" rtl="0" eaLnBrk="1" latinLnBrk="0" hangingPunct="1">
+              <a:spcBef>
+                <a:spcPct val="20000"/>
+              </a:spcBef>
+              <a:buFont typeface="Arial" pitchFamily="34" charset="0"/>
+              <a:buChar char="–"/>
+              <a:defRPr sz="2000" kern="1200">
+                <a:solidFill>
+                  <a:schemeClr val="lt1"/>
+                </a:solidFill>
+                <a:latin typeface="+mn-lt"/>
+                <a:ea typeface="+mn-ea"/>
+                <a:cs typeface="+mn-cs"/>
+              </a:defRPr>
+            </a:lvl2pPr>
+            <a:lvl3pPr marL="1143000" indent="-228600" algn="l" defTabSz="914400" rtl="0" eaLnBrk="1" latinLnBrk="0" hangingPunct="1">
+              <a:spcBef>
+                <a:spcPct val="20000"/>
+              </a:spcBef>
+              <a:buFont typeface="Arial" pitchFamily="34" charset="0"/>
+              <a:buChar char="•"/>
+              <a:defRPr sz="1800" kern="1200">
+                <a:solidFill>
+                  <a:schemeClr val="lt1"/>
+                </a:solidFill>
+                <a:latin typeface="+mn-lt"/>
+                <a:ea typeface="+mn-ea"/>
+                <a:cs typeface="+mn-cs"/>
+              </a:defRPr>
+            </a:lvl3pPr>
+            <a:lvl4pPr marL="1600200" indent="-228600" algn="l" defTabSz="914400" rtl="0" eaLnBrk="1" latinLnBrk="0" hangingPunct="1">
+              <a:spcBef>
+                <a:spcPct val="20000"/>
+              </a:spcBef>
+              <a:buFont typeface="Arial" pitchFamily="34" charset="0"/>
+              <a:buChar char="–"/>
+              <a:defRPr sz="1600" kern="1200">
+                <a:solidFill>
+                  <a:schemeClr val="lt1"/>
+                </a:solidFill>
+                <a:latin typeface="+mn-lt"/>
+                <a:ea typeface="+mn-ea"/>
+                <a:cs typeface="+mn-cs"/>
+              </a:defRPr>
+            </a:lvl4pPr>
+            <a:lvl5pPr marL="2057400" indent="-228600" algn="l" defTabSz="914400" rtl="0" eaLnBrk="1" latinLnBrk="0" hangingPunct="1">
+              <a:spcBef>
+                <a:spcPct val="20000"/>
+              </a:spcBef>
+              <a:buFont typeface="Arial" pitchFamily="34" charset="0"/>
+              <a:buChar char="»"/>
+              <a:defRPr sz="1600" kern="1200">
+                <a:solidFill>
+                  <a:schemeClr val="lt1"/>
+                </a:solidFill>
+                <a:latin typeface="+mn-lt"/>
+                <a:ea typeface="+mn-ea"/>
+                <a:cs typeface="+mn-cs"/>
+              </a:defRPr>
+            </a:lvl5pPr>
+            <a:lvl6pPr marL="2514600" indent="-228600" algn="l" defTabSz="914400" rtl="0" eaLnBrk="1" latinLnBrk="0" hangingPunct="1">
+              <a:spcBef>
+                <a:spcPct val="20000"/>
+              </a:spcBef>
+              <a:buFont typeface="Arial" pitchFamily="34" charset="0"/>
+              <a:buChar char="•"/>
+              <a:defRPr sz="1600" kern="1200">
+                <a:solidFill>
+                  <a:schemeClr val="lt1"/>
+                </a:solidFill>
+                <a:latin typeface="+mn-lt"/>
+                <a:ea typeface="+mn-ea"/>
+                <a:cs typeface="+mn-cs"/>
+              </a:defRPr>
+            </a:lvl6pPr>
+            <a:lvl7pPr marL="2971800" indent="-228600" algn="l" defTabSz="914400" rtl="0" eaLnBrk="1" latinLnBrk="0" hangingPunct="1">
+              <a:spcBef>
+                <a:spcPct val="20000"/>
+              </a:spcBef>
+              <a:buFont typeface="Arial" pitchFamily="34" charset="0"/>
+              <a:buChar char="•"/>
+              <a:defRPr sz="1600" kern="1200">
+                <a:solidFill>
+                  <a:schemeClr val="lt1"/>
+                </a:solidFill>
+                <a:latin typeface="+mn-lt"/>
+                <a:ea typeface="+mn-ea"/>
+                <a:cs typeface="+mn-cs"/>
+              </a:defRPr>
+            </a:lvl7pPr>
+            <a:lvl8pPr marL="3429000" indent="-228600" algn="l" defTabSz="914400" rtl="0" eaLnBrk="1" latinLnBrk="0" hangingPunct="1">
+              <a:spcBef>
+                <a:spcPct val="20000"/>
+              </a:spcBef>
+              <a:buFont typeface="Arial" pitchFamily="34" charset="0"/>
+              <a:buChar char="•"/>
+              <a:defRPr sz="1600" kern="1200">
+                <a:solidFill>
+                  <a:schemeClr val="lt1"/>
+                </a:solidFill>
+                <a:latin typeface="+mn-lt"/>
+                <a:ea typeface="+mn-ea"/>
+                <a:cs typeface="+mn-cs"/>
+              </a:defRPr>
+            </a:lvl8pPr>
+            <a:lvl9pPr marL="3886200" indent="-228600" algn="l" defTabSz="914400" rtl="0" eaLnBrk="1" latinLnBrk="0" hangingPunct="1">
+              <a:spcBef>
+                <a:spcPct val="20000"/>
+              </a:spcBef>
+              <a:buFont typeface="Arial" pitchFamily="34" charset="0"/>
+              <a:buChar char="•"/>
+              <a:defRPr sz="1600" kern="1200">
+                <a:solidFill>
+                  <a:schemeClr val="lt1"/>
+                </a:solidFill>
+                <a:latin typeface="+mn-lt"/>
+                <a:ea typeface="+mn-ea"/>
+                <a:cs typeface="+mn-cs"/>
+              </a:defRPr>
+            </a:lvl9pPr>
+          </a:lstStyle>
+          <a:p>
+            <a:pPr marL="0" indent="0">
+              <a:buFont typeface="Arial" pitchFamily="34" charset="0"/>
+              <a:buNone/>
+            </a:pPr>
+            <a:r>
+              <a:rPr lang="pt-BR" sz="1500" dirty="0"/>
+              <a:t>🚀 Visão</a:t>
+            </a:r>
+            <a:endParaRPr lang="pt-BR" sz="1500" dirty="0">
+              <a:solidFill>
+                <a:schemeClr val="bg1"/>
+              </a:solidFill>
+            </a:endParaRPr>
+          </a:p>
           <a:p>
             <a:pPr>
               <a:buFont typeface="Wingdings" pitchFamily="2" charset="2"/>
               <a:buChar char="v"/>
             </a:pPr>
             <a:r>
-              <a:rPr lang="pt-BR" dirty="0">
-                <a:solidFill>
-                  <a:schemeClr val="bg1"/>
-                </a:solidFill>
-              </a:rPr>
-              <a:t>Fornecer informações e recursos para que as pessoas possam cultivar seus próprios alimentos de forma sustentável e saudável, mesmo em espaços pequenos;</a:t>
+              <a:rPr lang="pt-BR" sz="1500" dirty="0"/>
+              <a:t>Ser a principal plataforma de e-commerce de sementes, unindo conhecimento, tecnologia e recompensas para criar uma comunidade global engajada na preservação ambiental e no cultivo consciente.</a:t>
+            </a:r>
+            <a:endParaRPr lang="pt-BR" sz="1500" dirty="0">
+              <a:solidFill>
+                <a:schemeClr val="bg1"/>
+              </a:solidFill>
+            </a:endParaRPr>
+          </a:p>
+        </p:txBody>
+      </p:sp>
+      <p:sp>
+        <p:nvSpPr>
+          <p:cNvPr id="10" name="Espaço Reservado para Conteúdo 7">
+            <a:extLst>
+              <a:ext uri="{FF2B5EF4-FFF2-40B4-BE49-F238E27FC236}">
+                <a16:creationId xmlns:a16="http://schemas.microsoft.com/office/drawing/2014/main" id="{B870CE0D-4A67-BB39-487B-69D58F660585}"/>
+              </a:ext>
+            </a:extLst>
+          </p:cNvPr>
+          <p:cNvSpPr txBox="1">
+            <a:spLocks/>
+          </p:cNvSpPr>
+          <p:nvPr/>
+        </p:nvSpPr>
+        <p:spPr>
+          <a:xfrm>
+            <a:off x="1547664" y="4170694"/>
+            <a:ext cx="7344816" cy="2068677"/>
+          </a:xfrm>
+          <a:prstGeom prst="rect">
+            <a:avLst/>
+          </a:prstGeom>
+          <a:solidFill>
+            <a:schemeClr val="accent3">
+              <a:alpha val="50000"/>
+            </a:schemeClr>
+          </a:solidFill>
+          <a:effectLst>
+            <a:outerShdw blurRad="50800" dist="50800" dir="5400000" algn="ctr" rotWithShape="0">
+              <a:schemeClr val="tx1">
+                <a:lumMod val="95000"/>
+                <a:lumOff val="5000"/>
+              </a:schemeClr>
+            </a:outerShdw>
+          </a:effectLst>
+        </p:spPr>
+        <p:style>
+          <a:lnRef idx="0">
+            <a:scrgbClr r="0" g="0" b="0"/>
+          </a:lnRef>
+          <a:fillRef idx="0">
+            <a:scrgbClr r="0" g="0" b="0"/>
+          </a:fillRef>
+          <a:effectRef idx="0">
+            <a:scrgbClr r="0" g="0" b="0"/>
+          </a:effectRef>
+          <a:fontRef idx="minor">
+            <a:schemeClr val="lt1"/>
+          </a:fontRef>
+        </p:style>
+        <p:txBody>
+          <a:bodyPr vert="horz" lIns="91440" tIns="45720" rIns="91440" bIns="45720" rtlCol="0" anchor="ctr">
+            <a:noAutofit/>
+          </a:bodyPr>
+          <a:lstStyle>
+            <a:lvl1pPr marL="342900" indent="-342900" algn="l" defTabSz="914400" rtl="0" eaLnBrk="1" latinLnBrk="0" hangingPunct="1">
+              <a:spcBef>
+                <a:spcPct val="20000"/>
+              </a:spcBef>
+              <a:buFont typeface="Arial" pitchFamily="34" charset="0"/>
+              <a:buChar char="•"/>
+              <a:defRPr sz="2400" kern="1200">
+                <a:solidFill>
+                  <a:schemeClr val="lt1"/>
+                </a:solidFill>
+                <a:latin typeface="+mn-lt"/>
+                <a:ea typeface="+mn-ea"/>
+                <a:cs typeface="+mn-cs"/>
+              </a:defRPr>
+            </a:lvl1pPr>
+            <a:lvl2pPr marL="742950" indent="-285750" algn="l" defTabSz="914400" rtl="0" eaLnBrk="1" latinLnBrk="0" hangingPunct="1">
+              <a:spcBef>
+                <a:spcPct val="20000"/>
+              </a:spcBef>
+              <a:buFont typeface="Arial" pitchFamily="34" charset="0"/>
+              <a:buChar char="–"/>
+              <a:defRPr sz="2000" kern="1200">
+                <a:solidFill>
+                  <a:schemeClr val="lt1"/>
+                </a:solidFill>
+                <a:latin typeface="+mn-lt"/>
+                <a:ea typeface="+mn-ea"/>
+                <a:cs typeface="+mn-cs"/>
+              </a:defRPr>
+            </a:lvl2pPr>
+            <a:lvl3pPr marL="1143000" indent="-228600" algn="l" defTabSz="914400" rtl="0" eaLnBrk="1" latinLnBrk="0" hangingPunct="1">
+              <a:spcBef>
+                <a:spcPct val="20000"/>
+              </a:spcBef>
+              <a:buFont typeface="Arial" pitchFamily="34" charset="0"/>
+              <a:buChar char="•"/>
+              <a:defRPr sz="1800" kern="1200">
+                <a:solidFill>
+                  <a:schemeClr val="lt1"/>
+                </a:solidFill>
+                <a:latin typeface="+mn-lt"/>
+                <a:ea typeface="+mn-ea"/>
+                <a:cs typeface="+mn-cs"/>
+              </a:defRPr>
+            </a:lvl3pPr>
+            <a:lvl4pPr marL="1600200" indent="-228600" algn="l" defTabSz="914400" rtl="0" eaLnBrk="1" latinLnBrk="0" hangingPunct="1">
+              <a:spcBef>
+                <a:spcPct val="20000"/>
+              </a:spcBef>
+              <a:buFont typeface="Arial" pitchFamily="34" charset="0"/>
+              <a:buChar char="–"/>
+              <a:defRPr sz="1600" kern="1200">
+                <a:solidFill>
+                  <a:schemeClr val="lt1"/>
+                </a:solidFill>
+                <a:latin typeface="+mn-lt"/>
+                <a:ea typeface="+mn-ea"/>
+                <a:cs typeface="+mn-cs"/>
+              </a:defRPr>
+            </a:lvl4pPr>
+            <a:lvl5pPr marL="2057400" indent="-228600" algn="l" defTabSz="914400" rtl="0" eaLnBrk="1" latinLnBrk="0" hangingPunct="1">
+              <a:spcBef>
+                <a:spcPct val="20000"/>
+              </a:spcBef>
+              <a:buFont typeface="Arial" pitchFamily="34" charset="0"/>
+              <a:buChar char="»"/>
+              <a:defRPr sz="1600" kern="1200">
+                <a:solidFill>
+                  <a:schemeClr val="lt1"/>
+                </a:solidFill>
+                <a:latin typeface="+mn-lt"/>
+                <a:ea typeface="+mn-ea"/>
+                <a:cs typeface="+mn-cs"/>
+              </a:defRPr>
+            </a:lvl5pPr>
+            <a:lvl6pPr marL="2514600" indent="-228600" algn="l" defTabSz="914400" rtl="0" eaLnBrk="1" latinLnBrk="0" hangingPunct="1">
+              <a:spcBef>
+                <a:spcPct val="20000"/>
+              </a:spcBef>
+              <a:buFont typeface="Arial" pitchFamily="34" charset="0"/>
+              <a:buChar char="•"/>
+              <a:defRPr sz="1600" kern="1200">
+                <a:solidFill>
+                  <a:schemeClr val="lt1"/>
+                </a:solidFill>
+                <a:latin typeface="+mn-lt"/>
+                <a:ea typeface="+mn-ea"/>
+                <a:cs typeface="+mn-cs"/>
+              </a:defRPr>
+            </a:lvl6pPr>
+            <a:lvl7pPr marL="2971800" indent="-228600" algn="l" defTabSz="914400" rtl="0" eaLnBrk="1" latinLnBrk="0" hangingPunct="1">
+              <a:spcBef>
+                <a:spcPct val="20000"/>
+              </a:spcBef>
+              <a:buFont typeface="Arial" pitchFamily="34" charset="0"/>
+              <a:buChar char="•"/>
+              <a:defRPr sz="1600" kern="1200">
+                <a:solidFill>
+                  <a:schemeClr val="lt1"/>
+                </a:solidFill>
+                <a:latin typeface="+mn-lt"/>
+                <a:ea typeface="+mn-ea"/>
+                <a:cs typeface="+mn-cs"/>
+              </a:defRPr>
+            </a:lvl7pPr>
+            <a:lvl8pPr marL="3429000" indent="-228600" algn="l" defTabSz="914400" rtl="0" eaLnBrk="1" latinLnBrk="0" hangingPunct="1">
+              <a:spcBef>
+                <a:spcPct val="20000"/>
+              </a:spcBef>
+              <a:buFont typeface="Arial" pitchFamily="34" charset="0"/>
+              <a:buChar char="•"/>
+              <a:defRPr sz="1600" kern="1200">
+                <a:solidFill>
+                  <a:schemeClr val="lt1"/>
+                </a:solidFill>
+                <a:latin typeface="+mn-lt"/>
+                <a:ea typeface="+mn-ea"/>
+                <a:cs typeface="+mn-cs"/>
+              </a:defRPr>
+            </a:lvl8pPr>
+            <a:lvl9pPr marL="3886200" indent="-228600" algn="l" defTabSz="914400" rtl="0" eaLnBrk="1" latinLnBrk="0" hangingPunct="1">
+              <a:spcBef>
+                <a:spcPct val="20000"/>
+              </a:spcBef>
+              <a:buFont typeface="Arial" pitchFamily="34" charset="0"/>
+              <a:buChar char="•"/>
+              <a:defRPr sz="1600" kern="1200">
+                <a:solidFill>
+                  <a:schemeClr val="lt1"/>
+                </a:solidFill>
+                <a:latin typeface="+mn-lt"/>
+                <a:ea typeface="+mn-ea"/>
+                <a:cs typeface="+mn-cs"/>
+              </a:defRPr>
+            </a:lvl9pPr>
+          </a:lstStyle>
+          <a:p>
+            <a:pPr marL="0" indent="0">
+              <a:buNone/>
+            </a:pPr>
+            <a:r>
+              <a:rPr lang="pt-BR" sz="1500" dirty="0"/>
+              <a:t>💚 Valores</a:t>
             </a:r>
           </a:p>
           <a:p>
@@ -3397,12 +3663,12 @@
               <a:buChar char="v"/>
             </a:pPr>
             <a:r>
-              <a:rPr lang="pt-BR" dirty="0">
+              <a:rPr lang="pt-BR" sz="1500" dirty="0">
                 <a:solidFill>
                   <a:schemeClr val="bg1"/>
                 </a:solidFill>
               </a:rPr>
-              <a:t>Atender a um público preocupado com a qualidade dos alimentos;</a:t>
+              <a:t>Sustentabilidade 🌱 – Incentivamos práticas agrícolas e hortas sustentáveis.</a:t>
             </a:r>
           </a:p>
           <a:p>
@@ -3411,42 +3677,261 @@
               <a:buChar char="v"/>
             </a:pPr>
             <a:r>
-              <a:rPr lang="pt-BR" dirty="0">
+              <a:rPr lang="pt-BR" sz="1500" dirty="0">
                 <a:solidFill>
                   <a:schemeClr val="bg1"/>
                 </a:solidFill>
               </a:rPr>
-              <a:t>Valores agregados: informação e recursos, produtos e serviços, conteúdo exclusivo, atualização constante, suporte usuário (e-mail,telefone) </a:t>
-            </a:r>
-          </a:p>
-        </p:txBody>
-      </p:sp>
-      <p:pic>
-        <p:nvPicPr>
-          <p:cNvPr id="12" name="Espaço Reservado para Conteúdo 11" descr="pexels-yankrukov-5480151.jpg"/>
-          <p:cNvPicPr>
-            <a:picLocks noGrp="1" noChangeAspect="1"/>
-          </p:cNvPicPr>
-          <p:nvPr>
-            <p:ph sz="quarter" idx="4"/>
-          </p:nvPr>
-        </p:nvPicPr>
-        <p:blipFill>
-          <a:blip r:embed="rId2" cstate="print"/>
-          <a:stretch>
-            <a:fillRect/>
-          </a:stretch>
-        </p:blipFill>
+              <a:t>Inovação 🔄 – Criar soluções tecnológicas para facilitar a experiência dos usuários.</a:t>
+            </a:r>
+          </a:p>
+          <a:p>
+            <a:pPr>
+              <a:buFont typeface="Wingdings" pitchFamily="2" charset="2"/>
+              <a:buChar char="v"/>
+            </a:pPr>
+            <a:r>
+              <a:rPr lang="pt-BR" sz="1500" dirty="0">
+                <a:solidFill>
+                  <a:schemeClr val="bg1"/>
+                </a:solidFill>
+              </a:rPr>
+              <a:t>Educação 📖 – Fornecemos informações detalhadas sobre o manuseio das sementes.</a:t>
+            </a:r>
+          </a:p>
+          <a:p>
+            <a:pPr>
+              <a:buFont typeface="Wingdings" pitchFamily="2" charset="2"/>
+              <a:buChar char="v"/>
+            </a:pPr>
+            <a:r>
+              <a:rPr lang="pt-BR" sz="1500" dirty="0">
+                <a:solidFill>
+                  <a:schemeClr val="bg1"/>
+                </a:solidFill>
+              </a:rPr>
+              <a:t>Comunidade 🤝 – Construímos uma rede colaborativa com benefícios para membros ativos.</a:t>
+            </a:r>
+          </a:p>
+        </p:txBody>
+      </p:sp>
+      <p:sp>
+        <p:nvSpPr>
+          <p:cNvPr id="11" name="Espaço Reservado para Conteúdo 7">
+            <a:extLst>
+              <a:ext uri="{FF2B5EF4-FFF2-40B4-BE49-F238E27FC236}">
+                <a16:creationId xmlns:a16="http://schemas.microsoft.com/office/drawing/2014/main" id="{C32A23E0-F9E7-294C-082E-3AE16CA50555}"/>
+              </a:ext>
+            </a:extLst>
+          </p:cNvPr>
+          <p:cNvSpPr txBox="1">
+            <a:spLocks/>
+          </p:cNvSpPr>
+          <p:nvPr/>
+        </p:nvSpPr>
         <p:spPr>
           <a:xfrm>
-            <a:off x="4860032" y="3717032"/>
-            <a:ext cx="4041775" cy="2694517"/>
+            <a:off x="323528" y="1807069"/>
+            <a:ext cx="6896000" cy="1053216"/>
           </a:xfrm>
+          <a:prstGeom prst="rect">
+            <a:avLst/>
+          </a:prstGeom>
+          <a:solidFill>
+            <a:schemeClr val="accent3">
+              <a:alpha val="50000"/>
+            </a:schemeClr>
+          </a:solidFill>
           <a:effectLst>
-            <a:softEdge rad="0"/>
+            <a:outerShdw blurRad="50800" dist="50800" dir="5400000" algn="ctr" rotWithShape="0">
+              <a:schemeClr val="tx1">
+                <a:lumMod val="95000"/>
+                <a:lumOff val="5000"/>
+              </a:schemeClr>
+            </a:outerShdw>
           </a:effectLst>
         </p:spPr>
-      </p:pic>
+        <p:style>
+          <a:lnRef idx="0">
+            <a:scrgbClr r="0" g="0" b="0"/>
+          </a:lnRef>
+          <a:fillRef idx="0">
+            <a:scrgbClr r="0" g="0" b="0"/>
+          </a:fillRef>
+          <a:effectRef idx="0">
+            <a:scrgbClr r="0" g="0" b="0"/>
+          </a:effectRef>
+          <a:fontRef idx="minor">
+            <a:schemeClr val="lt1"/>
+          </a:fontRef>
+        </p:style>
+        <p:txBody>
+          <a:bodyPr vert="horz" lIns="91440" tIns="45720" rIns="91440" bIns="45720" rtlCol="0" anchor="ctr">
+            <a:noAutofit/>
+          </a:bodyPr>
+          <a:lstStyle>
+            <a:lvl1pPr marL="342900" indent="-342900" algn="l" defTabSz="914400" rtl="0" eaLnBrk="1" latinLnBrk="0" hangingPunct="1">
+              <a:spcBef>
+                <a:spcPct val="20000"/>
+              </a:spcBef>
+              <a:buFont typeface="Arial" pitchFamily="34" charset="0"/>
+              <a:buChar char="•"/>
+              <a:defRPr sz="2400" kern="1200">
+                <a:solidFill>
+                  <a:schemeClr val="lt1"/>
+                </a:solidFill>
+                <a:latin typeface="+mn-lt"/>
+                <a:ea typeface="+mn-ea"/>
+                <a:cs typeface="+mn-cs"/>
+              </a:defRPr>
+            </a:lvl1pPr>
+            <a:lvl2pPr marL="742950" indent="-285750" algn="l" defTabSz="914400" rtl="0" eaLnBrk="1" latinLnBrk="0" hangingPunct="1">
+              <a:spcBef>
+                <a:spcPct val="20000"/>
+              </a:spcBef>
+              <a:buFont typeface="Arial" pitchFamily="34" charset="0"/>
+              <a:buChar char="–"/>
+              <a:defRPr sz="2000" kern="1200">
+                <a:solidFill>
+                  <a:schemeClr val="lt1"/>
+                </a:solidFill>
+                <a:latin typeface="+mn-lt"/>
+                <a:ea typeface="+mn-ea"/>
+                <a:cs typeface="+mn-cs"/>
+              </a:defRPr>
+            </a:lvl2pPr>
+            <a:lvl3pPr marL="1143000" indent="-228600" algn="l" defTabSz="914400" rtl="0" eaLnBrk="1" latinLnBrk="0" hangingPunct="1">
+              <a:spcBef>
+                <a:spcPct val="20000"/>
+              </a:spcBef>
+              <a:buFont typeface="Arial" pitchFamily="34" charset="0"/>
+              <a:buChar char="•"/>
+              <a:defRPr sz="1800" kern="1200">
+                <a:solidFill>
+                  <a:schemeClr val="lt1"/>
+                </a:solidFill>
+                <a:latin typeface="+mn-lt"/>
+                <a:ea typeface="+mn-ea"/>
+                <a:cs typeface="+mn-cs"/>
+              </a:defRPr>
+            </a:lvl3pPr>
+            <a:lvl4pPr marL="1600200" indent="-228600" algn="l" defTabSz="914400" rtl="0" eaLnBrk="1" latinLnBrk="0" hangingPunct="1">
+              <a:spcBef>
+                <a:spcPct val="20000"/>
+              </a:spcBef>
+              <a:buFont typeface="Arial" pitchFamily="34" charset="0"/>
+              <a:buChar char="–"/>
+              <a:defRPr sz="1600" kern="1200">
+                <a:solidFill>
+                  <a:schemeClr val="lt1"/>
+                </a:solidFill>
+                <a:latin typeface="+mn-lt"/>
+                <a:ea typeface="+mn-ea"/>
+                <a:cs typeface="+mn-cs"/>
+              </a:defRPr>
+            </a:lvl4pPr>
+            <a:lvl5pPr marL="2057400" indent="-228600" algn="l" defTabSz="914400" rtl="0" eaLnBrk="1" latinLnBrk="0" hangingPunct="1">
+              <a:spcBef>
+                <a:spcPct val="20000"/>
+              </a:spcBef>
+              <a:buFont typeface="Arial" pitchFamily="34" charset="0"/>
+              <a:buChar char="»"/>
+              <a:defRPr sz="1600" kern="1200">
+                <a:solidFill>
+                  <a:schemeClr val="lt1"/>
+                </a:solidFill>
+                <a:latin typeface="+mn-lt"/>
+                <a:ea typeface="+mn-ea"/>
+                <a:cs typeface="+mn-cs"/>
+              </a:defRPr>
+            </a:lvl5pPr>
+            <a:lvl6pPr marL="2514600" indent="-228600" algn="l" defTabSz="914400" rtl="0" eaLnBrk="1" latinLnBrk="0" hangingPunct="1">
+              <a:spcBef>
+                <a:spcPct val="20000"/>
+              </a:spcBef>
+              <a:buFont typeface="Arial" pitchFamily="34" charset="0"/>
+              <a:buChar char="•"/>
+              <a:defRPr sz="1600" kern="1200">
+                <a:solidFill>
+                  <a:schemeClr val="lt1"/>
+                </a:solidFill>
+                <a:latin typeface="+mn-lt"/>
+                <a:ea typeface="+mn-ea"/>
+                <a:cs typeface="+mn-cs"/>
+              </a:defRPr>
+            </a:lvl6pPr>
+            <a:lvl7pPr marL="2971800" indent="-228600" algn="l" defTabSz="914400" rtl="0" eaLnBrk="1" latinLnBrk="0" hangingPunct="1">
+              <a:spcBef>
+                <a:spcPct val="20000"/>
+              </a:spcBef>
+              <a:buFont typeface="Arial" pitchFamily="34" charset="0"/>
+              <a:buChar char="•"/>
+              <a:defRPr sz="1600" kern="1200">
+                <a:solidFill>
+                  <a:schemeClr val="lt1"/>
+                </a:solidFill>
+                <a:latin typeface="+mn-lt"/>
+                <a:ea typeface="+mn-ea"/>
+                <a:cs typeface="+mn-cs"/>
+              </a:defRPr>
+            </a:lvl7pPr>
+            <a:lvl8pPr marL="3429000" indent="-228600" algn="l" defTabSz="914400" rtl="0" eaLnBrk="1" latinLnBrk="0" hangingPunct="1">
+              <a:spcBef>
+                <a:spcPct val="20000"/>
+              </a:spcBef>
+              <a:buFont typeface="Arial" pitchFamily="34" charset="0"/>
+              <a:buChar char="•"/>
+              <a:defRPr sz="1600" kern="1200">
+                <a:solidFill>
+                  <a:schemeClr val="lt1"/>
+                </a:solidFill>
+                <a:latin typeface="+mn-lt"/>
+                <a:ea typeface="+mn-ea"/>
+                <a:cs typeface="+mn-cs"/>
+              </a:defRPr>
+            </a:lvl8pPr>
+            <a:lvl9pPr marL="3886200" indent="-228600" algn="l" defTabSz="914400" rtl="0" eaLnBrk="1" latinLnBrk="0" hangingPunct="1">
+              <a:spcBef>
+                <a:spcPct val="20000"/>
+              </a:spcBef>
+              <a:buFont typeface="Arial" pitchFamily="34" charset="0"/>
+              <a:buChar char="•"/>
+              <a:defRPr sz="1600" kern="1200">
+                <a:solidFill>
+                  <a:schemeClr val="lt1"/>
+                </a:solidFill>
+                <a:latin typeface="+mn-lt"/>
+                <a:ea typeface="+mn-ea"/>
+                <a:cs typeface="+mn-cs"/>
+              </a:defRPr>
+            </a:lvl9pPr>
+          </a:lstStyle>
+          <a:p>
+            <a:pPr marL="0" indent="0">
+              <a:buNone/>
+            </a:pPr>
+            <a:r>
+              <a:rPr lang="pt-BR" sz="1500" dirty="0"/>
+              <a:t>🌍 Missão</a:t>
+            </a:r>
+          </a:p>
+          <a:p>
+            <a:pPr>
+              <a:buFont typeface="Wingdings" pitchFamily="2" charset="2"/>
+              <a:buChar char="v"/>
+            </a:pPr>
+            <a:r>
+              <a:rPr lang="pt-BR" sz="1500" dirty="0"/>
+              <a:t>Facilitar o acesso a sementes de qualidade, promovendo a sustentabilidade e incentivando práticas ecológicas por meio de um ecossistema inovador que recompensa o engajamento dos usuários.</a:t>
+            </a:r>
+            <a:endParaRPr lang="pt-BR" sz="1500" dirty="0">
+              <a:solidFill>
+                <a:schemeClr val="bg1"/>
+              </a:solidFill>
+            </a:endParaRPr>
+          </a:p>
+        </p:txBody>
+      </p:sp>
     </p:spTree>
   </p:cSld>
   <p:clrMapOvr>
@@ -3495,7 +3980,7 @@
                   </a:outerShdw>
                 </a:effectLst>
               </a:rPr>
-              <a:t>Requisitos Funcionais</a:t>
+              <a:t>🎯 Objetivos</a:t>
             </a:r>
           </a:p>
         </p:txBody>
@@ -3570,7 +4055,9 @@
           </a:fontRef>
         </p:style>
         <p:txBody>
-          <a:bodyPr anchor="ctr"/>
+          <a:bodyPr anchor="ctr">
+            <a:normAutofit/>
+          </a:bodyPr>
           <a:lstStyle/>
           <a:p>
             <a:pPr>
@@ -3583,7 +4070,7 @@
                   <a:schemeClr val="bg1"/>
                 </a:solidFill>
               </a:rPr>
-              <a:t>Conteúdo informativo</a:t>
+              <a:t>Loja virtual</a:t>
             </a:r>
           </a:p>
           <a:p>
@@ -3597,7 +4084,7 @@
                   <a:schemeClr val="bg1"/>
                 </a:solidFill>
               </a:rPr>
-              <a:t>Loja virtual</a:t>
+              <a:t>Conteúdo informativo</a:t>
             </a:r>
           </a:p>
           <a:p>
@@ -3625,7 +4112,7 @@
                   <a:schemeClr val="bg1"/>
                 </a:solidFill>
               </a:rPr>
-              <a:t>Design responsivo</a:t>
+              <a:t>Sistema de fidelização</a:t>
             </a:r>
           </a:p>
           <a:p>
@@ -3639,7 +4126,7 @@
                   <a:schemeClr val="bg1"/>
                 </a:solidFill>
               </a:rPr>
-              <a:t>Segurança</a:t>
+              <a:t>Recompensa por uso diário</a:t>
             </a:r>
           </a:p>
           <a:p>
@@ -3653,7 +4140,7 @@
                   <a:schemeClr val="bg1"/>
                 </a:solidFill>
               </a:rPr>
-              <a:t>Integração com redes sociais</a:t>
+              <a:t>Cursos</a:t>
             </a:r>
           </a:p>
           <a:p>
@@ -3667,7 +4154,21 @@
                   <a:schemeClr val="bg1"/>
                 </a:solidFill>
               </a:rPr>
-              <a:t>Formulário de contato</a:t>
+              <a:t>Projeto social</a:t>
+            </a:r>
+          </a:p>
+          <a:p>
+            <a:pPr>
+              <a:buFont typeface="Wingdings" pitchFamily="2" charset="2"/>
+              <a:buChar char="v"/>
+            </a:pPr>
+            <a:r>
+              <a:rPr lang="pt-BR" dirty="0">
+                <a:solidFill>
+                  <a:schemeClr val="bg1"/>
+                </a:solidFill>
+              </a:rPr>
+              <a:t>Banco de alimentos</a:t>
             </a:r>
           </a:p>
         </p:txBody>
@@ -3699,432 +4200,6 @@
       </p:grpSpPr>
       <p:sp>
         <p:nvSpPr>
-          <p:cNvPr id="2" name="Título 1"/>
-          <p:cNvSpPr>
-            <a:spLocks noGrp="1"/>
-          </p:cNvSpPr>
-          <p:nvPr>
-            <p:ph type="title"/>
-          </p:nvPr>
-        </p:nvSpPr>
-        <p:spPr/>
-        <p:txBody>
-          <a:bodyPr/>
-          <a:lstStyle/>
-          <a:p>
-            <a:r>
-              <a:rPr lang="pt-BR" b="1" dirty="0">
-                <a:effectLst>
-                  <a:outerShdw blurRad="50800" dist="50800" dir="5400000" algn="ctr" rotWithShape="0">
-                    <a:srgbClr val="00B050"/>
-                  </a:outerShdw>
-                </a:effectLst>
-              </a:rPr>
-              <a:t>Requisitos não funcionais</a:t>
-            </a:r>
-          </a:p>
-        </p:txBody>
-      </p:sp>
-      <p:sp>
-        <p:nvSpPr>
-          <p:cNvPr id="6" name="Espaço Reservado para Conteúdo 5"/>
-          <p:cNvSpPr>
-            <a:spLocks noGrp="1"/>
-          </p:cNvSpPr>
-          <p:nvPr>
-            <p:ph sz="quarter" idx="4"/>
-          </p:nvPr>
-        </p:nvSpPr>
-        <p:spPr>
-          <a:xfrm>
-            <a:off x="251520" y="2780928"/>
-            <a:ext cx="4041775" cy="3744416"/>
-          </a:xfrm>
-          <a:solidFill>
-            <a:schemeClr val="accent3">
-              <a:alpha val="50000"/>
-            </a:schemeClr>
-          </a:solidFill>
-          <a:ln>
-            <a:noFill/>
-          </a:ln>
-          <a:effectLst>
-            <a:outerShdw blurRad="50800" dist="50800" dir="5400000" algn="ctr" rotWithShape="0">
-              <a:schemeClr val="tx1">
-                <a:lumMod val="95000"/>
-                <a:lumOff val="5000"/>
-              </a:schemeClr>
-            </a:outerShdw>
-          </a:effectLst>
-        </p:spPr>
-        <p:style>
-          <a:lnRef idx="0">
-            <a:scrgbClr r="0" g="0" b="0"/>
-          </a:lnRef>
-          <a:fillRef idx="0">
-            <a:scrgbClr r="0" g="0" b="0"/>
-          </a:fillRef>
-          <a:effectRef idx="0">
-            <a:scrgbClr r="0" g="0" b="0"/>
-          </a:effectRef>
-          <a:fontRef idx="minor">
-            <a:schemeClr val="lt1"/>
-          </a:fontRef>
-        </p:style>
-        <p:txBody>
-          <a:bodyPr anchor="ctr">
-            <a:normAutofit/>
-          </a:bodyPr>
-          <a:lstStyle/>
-          <a:p>
-            <a:pPr>
-              <a:buFont typeface="Wingdings" pitchFamily="2" charset="2"/>
-              <a:buChar char="v"/>
-            </a:pPr>
-            <a:r>
-              <a:rPr lang="pt-BR" dirty="0">
-                <a:solidFill>
-                  <a:schemeClr val="bg1"/>
-                </a:solidFill>
-              </a:rPr>
-              <a:t>Desempenho: escalabilidade  e disponibilidade;</a:t>
-            </a:r>
-          </a:p>
-          <a:p>
-            <a:pPr>
-              <a:buFont typeface="Wingdings" pitchFamily="2" charset="2"/>
-              <a:buChar char="v"/>
-            </a:pPr>
-            <a:r>
-              <a:rPr lang="pt-BR" dirty="0">
-                <a:solidFill>
-                  <a:schemeClr val="bg1"/>
-                </a:solidFill>
-              </a:rPr>
-              <a:t>Usabilidade: facilidade de navegação, design responsivo, acessibilidade;</a:t>
-            </a:r>
-          </a:p>
-          <a:p>
-            <a:pPr>
-              <a:buFont typeface="Wingdings" pitchFamily="2" charset="2"/>
-              <a:buChar char="v"/>
-            </a:pPr>
-            <a:r>
-              <a:rPr lang="pt-BR" dirty="0">
-                <a:solidFill>
-                  <a:schemeClr val="bg1"/>
-                </a:solidFill>
-              </a:rPr>
-              <a:t>Segurança: proteção de dados, certificado de segurança (SSL)</a:t>
-            </a:r>
-          </a:p>
-        </p:txBody>
-      </p:sp>
-      <p:pic>
-        <p:nvPicPr>
-          <p:cNvPr id="8" name="Espaço Reservado para Conteúdo 7" descr="priscilla-du-preez-zprIOk-vHQE-unsplash.jpg"/>
-          <p:cNvPicPr>
-            <a:picLocks noGrp="1" noChangeAspect="1"/>
-          </p:cNvPicPr>
-          <p:nvPr>
-            <p:ph sz="half" idx="2"/>
-          </p:nvPr>
-        </p:nvPicPr>
-        <p:blipFill>
-          <a:blip r:embed="rId2" cstate="print"/>
-          <a:stretch>
-            <a:fillRect/>
-          </a:stretch>
-        </p:blipFill>
-        <p:spPr>
-          <a:xfrm>
-            <a:off x="4646612" y="1417638"/>
-            <a:ext cx="4245868" cy="2830579"/>
-          </a:xfrm>
-        </p:spPr>
-      </p:pic>
-    </p:spTree>
-  </p:cSld>
-  <p:clrMapOvr>
-    <a:masterClrMapping/>
-  </p:clrMapOvr>
-</p:sld>
-</file>
-
-<file path=ppt/slides/slide5.xml><?xml version="1.0" encoding="utf-8"?>
-<p:sld xmlns:a="http://schemas.openxmlformats.org/drawingml/2006/main" xmlns:r="http://schemas.openxmlformats.org/officeDocument/2006/relationships" xmlns:p="http://schemas.openxmlformats.org/presentationml/2006/main">
-  <p:cSld>
-    <p:spTree>
-      <p:nvGrpSpPr>
-        <p:cNvPr id="1" name=""/>
-        <p:cNvGrpSpPr/>
-        <p:nvPr/>
-      </p:nvGrpSpPr>
-      <p:grpSpPr>
-        <a:xfrm>
-          <a:off x="0" y="0"/>
-          <a:ext cx="0" cy="0"/>
-          <a:chOff x="0" y="0"/>
-          <a:chExt cx="0" cy="0"/>
-        </a:xfrm>
-      </p:grpSpPr>
-      <p:sp>
-        <p:nvSpPr>
-          <p:cNvPr id="7" name="Título 6"/>
-          <p:cNvSpPr>
-            <a:spLocks noGrp="1"/>
-          </p:cNvSpPr>
-          <p:nvPr>
-            <p:ph type="title"/>
-          </p:nvPr>
-        </p:nvSpPr>
-        <p:spPr/>
-        <p:txBody>
-          <a:bodyPr>
-            <a:normAutofit fontScale="90000"/>
-          </a:bodyPr>
-          <a:lstStyle/>
-          <a:p>
-            <a:r>
-              <a:rPr lang="pt-BR" b="1" dirty="0">
-                <a:effectLst>
-                  <a:outerShdw blurRad="50800" dist="50800" dir="5400000" algn="ctr" rotWithShape="0">
-                    <a:srgbClr val="00B050"/>
-                  </a:outerShdw>
-                </a:effectLst>
-              </a:rPr>
-              <a:t>O que pode ser adicionado depois?</a:t>
-            </a:r>
-          </a:p>
-        </p:txBody>
-      </p:sp>
-      <p:sp>
-        <p:nvSpPr>
-          <p:cNvPr id="8" name="Espaço Reservado para Conteúdo 7"/>
-          <p:cNvSpPr>
-            <a:spLocks noGrp="1"/>
-          </p:cNvSpPr>
-          <p:nvPr>
-            <p:ph sz="half" idx="1"/>
-          </p:nvPr>
-        </p:nvSpPr>
-        <p:spPr>
-          <a:xfrm>
-            <a:off x="395536" y="1412777"/>
-            <a:ext cx="4176464" cy="2160239"/>
-          </a:xfrm>
-          <a:solidFill>
-            <a:schemeClr val="accent3">
-              <a:alpha val="50000"/>
-            </a:schemeClr>
-          </a:solidFill>
-          <a:ln>
-            <a:noFill/>
-          </a:ln>
-          <a:effectLst>
-            <a:outerShdw blurRad="50800" dist="50800" dir="5400000" algn="ctr" rotWithShape="0">
-              <a:schemeClr val="bg2">
-                <a:lumMod val="10000"/>
-              </a:schemeClr>
-            </a:outerShdw>
-          </a:effectLst>
-        </p:spPr>
-        <p:style>
-          <a:lnRef idx="0">
-            <a:scrgbClr r="0" g="0" b="0"/>
-          </a:lnRef>
-          <a:fillRef idx="0">
-            <a:scrgbClr r="0" g="0" b="0"/>
-          </a:fillRef>
-          <a:effectRef idx="0">
-            <a:scrgbClr r="0" g="0" b="0"/>
-          </a:effectRef>
-          <a:fontRef idx="minor">
-            <a:schemeClr val="lt1"/>
-          </a:fontRef>
-        </p:style>
-        <p:txBody>
-          <a:bodyPr anchor="ctr">
-            <a:normAutofit fontScale="92500" lnSpcReduction="20000"/>
-          </a:bodyPr>
-          <a:lstStyle/>
-          <a:p>
-            <a:pPr>
-              <a:buFont typeface="Wingdings" pitchFamily="2" charset="2"/>
-              <a:buChar char="v"/>
-            </a:pPr>
-            <a:r>
-              <a:rPr lang="pt-BR" dirty="0">
-                <a:solidFill>
-                  <a:schemeClr val="bg1"/>
-                </a:solidFill>
-              </a:rPr>
-              <a:t>Sistema de fidelização</a:t>
-            </a:r>
-          </a:p>
-          <a:p>
-            <a:pPr>
-              <a:buFont typeface="Wingdings" pitchFamily="2" charset="2"/>
-              <a:buChar char="v"/>
-            </a:pPr>
-            <a:r>
-              <a:rPr lang="pt-BR" dirty="0">
-                <a:solidFill>
-                  <a:schemeClr val="bg1"/>
-                </a:solidFill>
-              </a:rPr>
-              <a:t>Recompensa por uso diário</a:t>
-            </a:r>
-          </a:p>
-          <a:p>
-            <a:pPr>
-              <a:buFont typeface="Wingdings" pitchFamily="2" charset="2"/>
-              <a:buChar char="v"/>
-            </a:pPr>
-            <a:r>
-              <a:rPr lang="pt-BR" dirty="0">
-                <a:solidFill>
-                  <a:schemeClr val="bg1"/>
-                </a:solidFill>
-              </a:rPr>
-              <a:t>Cursos</a:t>
-            </a:r>
-          </a:p>
-          <a:p>
-            <a:pPr>
-              <a:buFont typeface="Wingdings" pitchFamily="2" charset="2"/>
-              <a:buChar char="v"/>
-            </a:pPr>
-            <a:r>
-              <a:rPr lang="pt-BR" dirty="0">
-                <a:solidFill>
-                  <a:schemeClr val="bg1"/>
-                </a:solidFill>
-              </a:rPr>
-              <a:t>Projeto social</a:t>
-            </a:r>
-          </a:p>
-          <a:p>
-            <a:pPr>
-              <a:buFont typeface="Wingdings" pitchFamily="2" charset="2"/>
-              <a:buChar char="v"/>
-            </a:pPr>
-            <a:r>
-              <a:rPr lang="pt-BR" dirty="0">
-                <a:solidFill>
-                  <a:schemeClr val="bg1"/>
-                </a:solidFill>
-              </a:rPr>
-              <a:t>Banco de alimentos</a:t>
-            </a:r>
-          </a:p>
-        </p:txBody>
-      </p:sp>
-      <p:pic>
-        <p:nvPicPr>
-          <p:cNvPr id="10" name="Espaço Reservado para Conteúdo 9" descr="pexels-vanessa-loring-5971864.jpg"/>
-          <p:cNvPicPr>
-            <a:picLocks noGrp="1" noChangeAspect="1"/>
-          </p:cNvPicPr>
-          <p:nvPr>
-            <p:ph sz="half" idx="2"/>
-          </p:nvPr>
-        </p:nvPicPr>
-        <p:blipFill>
-          <a:blip r:embed="rId2" cstate="print"/>
-          <a:stretch>
-            <a:fillRect/>
-          </a:stretch>
-        </p:blipFill>
-        <p:spPr>
-          <a:xfrm>
-            <a:off x="4709866" y="3573016"/>
-            <a:ext cx="4248472" cy="2835394"/>
-          </a:xfrm>
-        </p:spPr>
-      </p:pic>
-    </p:spTree>
-  </p:cSld>
-  <p:clrMapOvr>
-    <a:masterClrMapping/>
-  </p:clrMapOvr>
-</p:sld>
-</file>
-
-<file path=ppt/slides/slide6.xml><?xml version="1.0" encoding="utf-8"?>
-<p:sld xmlns:a="http://schemas.openxmlformats.org/drawingml/2006/main" xmlns:r="http://schemas.openxmlformats.org/officeDocument/2006/relationships" xmlns:p="http://schemas.openxmlformats.org/presentationml/2006/main">
-  <p:cSld>
-    <p:spTree>
-      <p:nvGrpSpPr>
-        <p:cNvPr id="1" name=""/>
-        <p:cNvGrpSpPr/>
-        <p:nvPr/>
-      </p:nvGrpSpPr>
-      <p:grpSpPr>
-        <a:xfrm>
-          <a:off x="0" y="0"/>
-          <a:ext cx="0" cy="0"/>
-          <a:chOff x="0" y="0"/>
-          <a:chExt cx="0" cy="0"/>
-        </a:xfrm>
-      </p:grpSpPr>
-      <p:sp>
-        <p:nvSpPr>
-          <p:cNvPr id="2" name="Título 1"/>
-          <p:cNvSpPr>
-            <a:spLocks noGrp="1"/>
-          </p:cNvSpPr>
-          <p:nvPr>
-            <p:ph type="title"/>
-          </p:nvPr>
-        </p:nvSpPr>
-        <p:spPr>
-          <a:xfrm>
-            <a:off x="683568" y="260648"/>
-            <a:ext cx="7772400" cy="1362075"/>
-          </a:xfrm>
-          <a:effectLst>
-            <a:outerShdw blurRad="50800" dist="50800" dir="5400000" algn="ctr" rotWithShape="0">
-              <a:srgbClr val="00B050"/>
-            </a:outerShdw>
-          </a:effectLst>
-        </p:spPr>
-        <p:txBody>
-          <a:bodyPr anchor="ctr"/>
-          <a:lstStyle/>
-          <a:p>
-            <a:pPr algn="ctr"/>
-            <a:r>
-              <a:rPr lang="pt-BR" dirty="0">
-                <a:effectLst>
-                  <a:outerShdw blurRad="50800" dist="38100" dir="5400000" algn="t" rotWithShape="0">
-                    <a:srgbClr val="00B050">
-                      <a:alpha val="40000"/>
-                    </a:srgbClr>
-                  </a:outerShdw>
-                </a:effectLst>
-              </a:rPr>
-              <a:t>Arquitetura e Tecnologia</a:t>
-            </a:r>
-            <a:endParaRPr lang="pt-BR" dirty="0">
-              <a:solidFill>
-                <a:schemeClr val="bg2">
-                  <a:lumMod val="90000"/>
-                </a:schemeClr>
-              </a:solidFill>
-              <a:effectLst>
-                <a:outerShdw blurRad="50800" dist="38100" dir="5400000" algn="t" rotWithShape="0">
-                  <a:srgbClr val="00B050">
-                    <a:alpha val="40000"/>
-                  </a:srgbClr>
-                </a:outerShdw>
-              </a:effectLst>
-            </a:endParaRPr>
-          </a:p>
-        </p:txBody>
-      </p:sp>
-      <p:sp>
-        <p:nvSpPr>
           <p:cNvPr id="3" name="Espaço Reservado para Conteúdo 7">
             <a:extLst>
               <a:ext uri="{FF2B5EF4-FFF2-40B4-BE49-F238E27FC236}">
@@ -4139,8 +4214,8 @@
         </p:nvSpPr>
         <p:spPr>
           <a:xfrm>
-            <a:off x="1221396" y="2132856"/>
-            <a:ext cx="6696744" cy="3240359"/>
+            <a:off x="251521" y="1628800"/>
+            <a:ext cx="4248472" cy="2592288"/>
           </a:xfrm>
           <a:prstGeom prst="rect">
             <a:avLst/>
@@ -4341,28 +4416,12 @@
               <a:buChar char="v"/>
             </a:pPr>
             <a:r>
-              <a:rPr lang="pt-BR" sz="3200" dirty="0">
+              <a:rPr lang="pt-BR" sz="2400" dirty="0">
                 <a:solidFill>
                   <a:schemeClr val="bg1"/>
                 </a:solidFill>
               </a:rPr>
-              <a:t>Arquitetura híbrida Monolítica e </a:t>
-            </a:r>
-            <a:r>
-              <a:rPr lang="pt-BR" sz="3200" dirty="0" err="1">
-                <a:solidFill>
-                  <a:schemeClr val="bg1"/>
-                </a:solidFill>
-              </a:rPr>
-              <a:t>microsservice</a:t>
-            </a:r>
-            <a:r>
-              <a:rPr lang="pt-BR" sz="3200" dirty="0">
-                <a:solidFill>
-                  <a:schemeClr val="bg1"/>
-                </a:solidFill>
-              </a:rPr>
-              <a:t>;</a:t>
+              <a:t>Arquitetura Monolítica e microsservice;</a:t>
             </a:r>
           </a:p>
           <a:p>
@@ -4371,44 +4430,12 @@
               <a:buChar char="v"/>
             </a:pPr>
             <a:r>
-              <a:rPr lang="pt-BR" sz="3200" dirty="0">
+              <a:rPr lang="pt-BR" sz="2400" dirty="0">
                 <a:solidFill>
                   <a:schemeClr val="bg1"/>
                 </a:solidFill>
               </a:rPr>
-              <a:t>Linguagens: </a:t>
-            </a:r>
-            <a:r>
-              <a:rPr lang="pt-BR" sz="3200" dirty="0" err="1">
-                <a:solidFill>
-                  <a:schemeClr val="bg1"/>
-                </a:solidFill>
-              </a:rPr>
-              <a:t>Html</a:t>
-            </a:r>
-            <a:r>
-              <a:rPr lang="pt-BR" sz="3200" dirty="0">
-                <a:solidFill>
-                  <a:schemeClr val="bg1"/>
-                </a:solidFill>
-              </a:rPr>
-              <a:t>, CSS, </a:t>
-            </a:r>
-            <a:r>
-              <a:rPr lang="pt-BR" sz="3200" dirty="0" err="1">
-                <a:solidFill>
-                  <a:schemeClr val="bg1"/>
-                </a:solidFill>
-              </a:rPr>
-              <a:t>JavaScipt</a:t>
-            </a:r>
-            <a:r>
-              <a:rPr lang="pt-BR" sz="3200" dirty="0">
-                <a:solidFill>
-                  <a:schemeClr val="bg1"/>
-                </a:solidFill>
-              </a:rPr>
-              <a:t>;</a:t>
+              <a:t>Linguagens: Html, CSS, Javascript;</a:t>
             </a:r>
           </a:p>
           <a:p>
@@ -4417,28 +4444,12 @@
               <a:buChar char="v"/>
             </a:pPr>
             <a:r>
-              <a:rPr lang="pt-BR" sz="3200" dirty="0">
+              <a:rPr lang="pt-BR" sz="2400" dirty="0">
                 <a:solidFill>
                   <a:schemeClr val="bg1"/>
                 </a:solidFill>
               </a:rPr>
-              <a:t>Versionamento de código: </a:t>
-            </a:r>
-            <a:r>
-              <a:rPr lang="pt-BR" sz="3200" dirty="0" err="1">
-                <a:solidFill>
-                  <a:schemeClr val="bg1"/>
-                </a:solidFill>
-              </a:rPr>
-              <a:t>Git</a:t>
-            </a:r>
-            <a:r>
-              <a:rPr lang="pt-BR" sz="3200" dirty="0">
-                <a:solidFill>
-                  <a:schemeClr val="bg1"/>
-                </a:solidFill>
-              </a:rPr>
-              <a:t>;</a:t>
+              <a:t>Versionamento de código: Git;</a:t>
             </a:r>
           </a:p>
           <a:p>
@@ -4447,32 +4458,88 @@
               <a:buChar char="v"/>
             </a:pPr>
             <a:r>
-              <a:rPr lang="pt-BR" sz="3200" dirty="0">
+              <a:rPr lang="pt-BR" sz="2400" dirty="0">
                 <a:solidFill>
                   <a:schemeClr val="bg1"/>
                 </a:solidFill>
               </a:rPr>
-              <a:t>Hospedagem: </a:t>
-            </a:r>
-            <a:r>
-              <a:rPr lang="pt-BR" sz="3200" dirty="0" err="1">
-                <a:solidFill>
-                  <a:schemeClr val="bg1"/>
-                </a:solidFill>
+              <a:t>Hospedagem: Github;</a:t>
+            </a:r>
+          </a:p>
+        </p:txBody>
+      </p:sp>
+      <p:sp>
+        <p:nvSpPr>
+          <p:cNvPr id="8" name="CaixaDeTexto 7">
+            <a:extLst>
+              <a:ext uri="{FF2B5EF4-FFF2-40B4-BE49-F238E27FC236}">
+                <a16:creationId xmlns:a16="http://schemas.microsoft.com/office/drawing/2014/main" id="{D7C31F7D-1F8B-6237-C273-8D38883DD83C}"/>
+              </a:ext>
+            </a:extLst>
+          </p:cNvPr>
+          <p:cNvSpPr txBox="1"/>
+          <p:nvPr/>
+        </p:nvSpPr>
+        <p:spPr>
+          <a:xfrm>
+            <a:off x="1115616" y="476672"/>
+            <a:ext cx="6912768" cy="769441"/>
+          </a:xfrm>
+          <a:prstGeom prst="rect">
+            <a:avLst/>
+          </a:prstGeom>
+          <a:noFill/>
+        </p:spPr>
+        <p:txBody>
+          <a:bodyPr wrap="square" rtlCol="0">
+            <a:spAutoFit/>
+          </a:bodyPr>
+          <a:lstStyle/>
+          <a:p>
+            <a:r>
+              <a:rPr lang="pt-BR" sz="4400" b="1" dirty="0"/>
+              <a:t>👨‍💻 </a:t>
+            </a:r>
+            <a:r>
+              <a:rPr lang="pt-BR" sz="4400" b="1" dirty="0">
+                <a:effectLst>
+                  <a:outerShdw blurRad="50800" dist="50800" dir="5400000" algn="ctr" rotWithShape="0">
+                    <a:srgbClr val="00B050"/>
+                  </a:outerShdw>
+                </a:effectLst>
               </a:rPr>
-              <a:t>Github</a:t>
-            </a:r>
-            <a:r>
-              <a:rPr lang="pt-BR" sz="3200" dirty="0">
-                <a:solidFill>
-                  <a:schemeClr val="bg1"/>
-                </a:solidFill>
-              </a:rPr>
-              <a:t>;</a:t>
-            </a:r>
-          </a:p>
-        </p:txBody>
-      </p:sp>
+              <a:t>Arquitetura e Tecnologia</a:t>
+            </a:r>
+          </a:p>
+        </p:txBody>
+      </p:sp>
+      <p:pic>
+        <p:nvPicPr>
+          <p:cNvPr id="12" name="Espaço Reservado para Conteúdo 11" descr="pexels-yankrukov-5480151.jpg"/>
+          <p:cNvPicPr>
+            <a:picLocks noChangeAspect="1"/>
+          </p:cNvPicPr>
+          <p:nvPr/>
+        </p:nvPicPr>
+        <p:blipFill>
+          <a:blip r:embed="rId2" cstate="print"/>
+          <a:stretch>
+            <a:fillRect/>
+          </a:stretch>
+        </p:blipFill>
+        <p:spPr>
+          <a:xfrm>
+            <a:off x="4818073" y="3440027"/>
+            <a:ext cx="4041775" cy="2694517"/>
+          </a:xfrm>
+          <a:prstGeom prst="rect">
+            <a:avLst/>
+          </a:prstGeom>
+          <a:effectLst>
+            <a:softEdge rad="0"/>
+          </a:effectLst>
+        </p:spPr>
+      </p:pic>
     </p:spTree>
   </p:cSld>
   <p:clrMapOvr>
@@ -4481,7 +4548,7 @@
 </p:sld>
 </file>
 
-<file path=ppt/slides/slide7.xml><?xml version="1.0" encoding="utf-8"?>
+<file path=ppt/slides/slide5.xml><?xml version="1.0" encoding="utf-8"?>
 <p:sld xmlns:a="http://schemas.openxmlformats.org/drawingml/2006/main" xmlns:r="http://schemas.openxmlformats.org/officeDocument/2006/relationships" xmlns:p="http://schemas.openxmlformats.org/presentationml/2006/main">
   <p:cSld>
     <p:spTree>
@@ -4528,34 +4595,11 @@
             <a:pPr algn="ctr"/>
             <a:r>
               <a:rPr lang="pt-BR" sz="4000" dirty="0"/>
-              <a:t>Desenvolvimento e metodologia</a:t>
-            </a:r>
-          </a:p>
-        </p:txBody>
-      </p:sp>
-      <p:pic>
-        <p:nvPicPr>
-          <p:cNvPr id="8" name="Espaço Reservado para Conteúdo 7" descr="pexels-bianeyre-1560065.jpg"/>
-          <p:cNvPicPr>
-            <a:picLocks noGrp="1" noChangeAspect="1"/>
-          </p:cNvPicPr>
-          <p:nvPr>
-            <p:ph idx="1"/>
-          </p:nvPr>
-        </p:nvPicPr>
-        <p:blipFill>
-          <a:blip r:embed="rId2" cstate="print"/>
-          <a:stretch>
-            <a:fillRect/>
-          </a:stretch>
-        </p:blipFill>
-        <p:spPr>
-          <a:xfrm>
-            <a:off x="4555376" y="2996952"/>
-            <a:ext cx="4320480" cy="3456384"/>
-          </a:xfrm>
-        </p:spPr>
-      </p:pic>
+              <a:t>📈 Desenvolvimento e metodologia</a:t>
+            </a:r>
+          </a:p>
+        </p:txBody>
+      </p:sp>
       <p:sp>
         <p:nvSpPr>
           <p:cNvPr id="7" name="Espaço Reservado para Texto 6"/>
@@ -4569,7 +4613,7 @@
         <p:spPr>
           <a:xfrm>
             <a:off x="457200" y="1435101"/>
-            <a:ext cx="3588544" cy="3650084"/>
+            <a:ext cx="3588544" cy="3218035"/>
           </a:xfrm>
           <a:solidFill>
             <a:schemeClr val="accent3">
@@ -4613,13 +4657,20 @@
               <a:buChar char="v"/>
             </a:pPr>
             <a:r>
-              <a:rPr lang="pt-BR" sz="2800" dirty="0">
+              <a:rPr lang="pt-BR" sz="2400" dirty="0">
                 <a:solidFill>
                   <a:schemeClr val="bg1"/>
                 </a:solidFill>
               </a:rPr>
-              <a:t>O controle de tarefas e acompanhamento de progresso, será realizada em reuniões quinzenais.</a:t>
-            </a:r>
+              <a:t>O controle das tarefas e acompanhamento de progresso, foram realizadas em Sprints quinzenais.</a:t>
+            </a:r>
+          </a:p>
+          <a:p>
+            <a:endParaRPr lang="pt-BR" sz="2400" dirty="0">
+              <a:solidFill>
+                <a:schemeClr val="bg1"/>
+              </a:solidFill>
+            </a:endParaRPr>
           </a:p>
           <a:p>
             <a:pPr>
@@ -4627,32 +4678,46 @@
               <a:buChar char="v"/>
             </a:pPr>
             <a:r>
-              <a:rPr lang="pt-BR" sz="2800" dirty="0">
+              <a:rPr lang="pt-BR" sz="2400" dirty="0">
                 <a:solidFill>
                   <a:schemeClr val="bg1"/>
                 </a:solidFill>
               </a:rPr>
-              <a:t>A frequência das entregas e </a:t>
-            </a:r>
-            <a:r>
-              <a:rPr lang="pt-BR" sz="2800" dirty="0" err="1">
-                <a:solidFill>
-                  <a:schemeClr val="bg1"/>
-                </a:solidFill>
-              </a:rPr>
-              <a:t>deploys</a:t>
-            </a:r>
-            <a:r>
-              <a:rPr lang="pt-BR" sz="2800" dirty="0">
-                <a:solidFill>
-                  <a:schemeClr val="bg1"/>
-                </a:solidFill>
-              </a:rPr>
-              <a:t> será quinzenal. </a:t>
-            </a:r>
-          </a:p>
-        </p:txBody>
-      </p:sp>
+              <a:t>Apresentação dos incrementos em todas as Sprints.</a:t>
+            </a:r>
+          </a:p>
+        </p:txBody>
+      </p:sp>
+      <p:pic>
+        <p:nvPicPr>
+          <p:cNvPr id="6" name="Imagem 5">
+            <a:extLst>
+              <a:ext uri="{FF2B5EF4-FFF2-40B4-BE49-F238E27FC236}">
+                <a16:creationId xmlns:a16="http://schemas.microsoft.com/office/drawing/2014/main" id="{330963C2-32BD-E566-3D85-454C5F7B225B}"/>
+              </a:ext>
+            </a:extLst>
+          </p:cNvPr>
+          <p:cNvPicPr>
+            <a:picLocks noChangeAspect="1"/>
+          </p:cNvPicPr>
+          <p:nvPr/>
+        </p:nvPicPr>
+        <p:blipFill>
+          <a:blip r:embed="rId2"/>
+          <a:stretch>
+            <a:fillRect/>
+          </a:stretch>
+        </p:blipFill>
+        <p:spPr>
+          <a:xfrm>
+            <a:off x="4602832" y="3645024"/>
+            <a:ext cx="4257675" cy="2838450"/>
+          </a:xfrm>
+          <a:prstGeom prst="rect">
+            <a:avLst/>
+          </a:prstGeom>
+        </p:spPr>
+      </p:pic>
     </p:spTree>
   </p:cSld>
   <p:clrMapOvr>

</xml_diff>